<commit_message>
Modificaciones en los links
</commit_message>
<xml_diff>
--- a/Presentación HMIS/MSBuild in Visual Studio.pptx
+++ b/Presentación HMIS/MSBuild in Visual Studio.pptx
@@ -229,7 +229,7 @@
           <a:p>
             <a:fld id="{822FEE0E-2986-8742-BCAD-017A2D98633F}" type="datetimeFigureOut">
               <a:rPr lang="es-ES_tradnl" smtClean="0"/>
-              <a:t>28/5/17</a:t>
+              <a:t>29/5/17</a:t>
             </a:fld>
             <a:endParaRPr lang="es-ES_tradnl"/>
           </a:p>
@@ -693,7 +693,7 @@
           <a:p>
             <a:fld id="{ECD19FB2-3AAB-4D03-B13A-2960828C78E3}" type="datetimeFigureOut">
               <a:rPr lang="en-US" dirty="0"/>
-              <a:t>5/28/17</a:t>
+              <a:t>5/29/17</a:t>
             </a:fld>
             <a:endParaRPr lang="en-US" dirty="0"/>
           </a:p>
@@ -970,7 +970,7 @@
           <a:p>
             <a:fld id="{1B80C674-7DFC-42FE-B9CD-82963CDB1557}" type="datetimeFigureOut">
               <a:rPr lang="en-US" dirty="0"/>
-              <a:t>5/28/17</a:t>
+              <a:t>5/29/17</a:t>
             </a:fld>
             <a:endParaRPr lang="en-US" dirty="0"/>
           </a:p>
@@ -1157,7 +1157,7 @@
           <a:p>
             <a:fld id="{2076456F-F47D-4F25-8053-2A695DA0CA7D}" type="datetimeFigureOut">
               <a:rPr lang="en-US" dirty="0"/>
-              <a:t>5/28/17</a:t>
+              <a:t>5/29/17</a:t>
             </a:fld>
             <a:endParaRPr lang="en-US" dirty="0"/>
           </a:p>
@@ -1413,7 +1413,7 @@
           <a:p>
             <a:fld id="{5D6C7379-69CC-4837-9905-BEBA22830C8A}" type="datetimeFigureOut">
               <a:rPr lang="en-US" dirty="0"/>
-              <a:t>5/28/17</a:t>
+              <a:t>5/29/17</a:t>
             </a:fld>
             <a:endParaRPr lang="en-US" dirty="0"/>
           </a:p>
@@ -1834,7 +1834,7 @@
           <a:p>
             <a:fld id="{49EB8B7E-8AEE-4F10-BFEE-C999AD004D36}" type="datetimeFigureOut">
               <a:rPr lang="en-US" dirty="0"/>
-              <a:t>5/28/17</a:t>
+              <a:t>5/29/17</a:t>
             </a:fld>
             <a:endParaRPr lang="en-US" dirty="0"/>
           </a:p>
@@ -2375,7 +2375,7 @@
           <a:p>
             <a:fld id="{8668F3F9-58BC-440B-B37B-805B9055EF92}" type="datetimeFigureOut">
               <a:rPr lang="en-US" dirty="0"/>
-              <a:t>5/28/17</a:t>
+              <a:t>5/29/17</a:t>
             </a:fld>
             <a:endParaRPr lang="en-US" dirty="0"/>
           </a:p>
@@ -3201,7 +3201,7 @@
           <a:p>
             <a:fld id="{0D5A53AF-48EA-489D-8260-9DCAB666386A}" type="datetimeFigureOut">
               <a:rPr lang="en-US" dirty="0"/>
-              <a:t>5/28/17</a:t>
+              <a:t>5/29/17</a:t>
             </a:fld>
             <a:endParaRPr lang="en-US" dirty="0"/>
           </a:p>
@@ -3366,7 +3366,7 @@
           <a:p>
             <a:fld id="{0DED02AE-B9A4-47BD-AF8E-97E16144138B}" type="datetimeFigureOut">
               <a:rPr lang="en-US" dirty="0"/>
-              <a:t>5/28/17</a:t>
+              <a:t>5/29/17</a:t>
             </a:fld>
             <a:endParaRPr lang="en-US" dirty="0"/>
           </a:p>
@@ -3541,7 +3541,7 @@
           <a:p>
             <a:fld id="{CF0FD78B-DB02-4362-BCDC-98A55456977C}" type="datetimeFigureOut">
               <a:rPr lang="en-US" dirty="0"/>
-              <a:t>5/28/17</a:t>
+              <a:t>5/29/17</a:t>
             </a:fld>
             <a:endParaRPr lang="en-US" dirty="0"/>
           </a:p>
@@ -3706,7 +3706,7 @@
           <a:p>
             <a:fld id="{99916976-5D93-46E4-A98A-FAD63E4D0EA8}" type="datetimeFigureOut">
               <a:rPr lang="en-US" dirty="0"/>
-              <a:t>5/28/17</a:t>
+              <a:t>5/29/17</a:t>
             </a:fld>
             <a:endParaRPr lang="en-US" dirty="0"/>
           </a:p>
@@ -3958,7 +3958,7 @@
           <a:p>
             <a:fld id="{0F39F4F5-F4D2-4D2A-AB60-88D37ADCB869}" type="datetimeFigureOut">
               <a:rPr lang="en-US" dirty="0"/>
-              <a:t>5/28/17</a:t>
+              <a:t>5/29/17</a:t>
             </a:fld>
             <a:endParaRPr lang="en-US" dirty="0"/>
           </a:p>
@@ -4185,7 +4185,7 @@
           <a:p>
             <a:fld id="{D23BC6CE-6D1E-47E5-8859-F31AC5380EB2}" type="datetimeFigureOut">
               <a:rPr lang="en-US" dirty="0"/>
-              <a:t>5/28/17</a:t>
+              <a:t>5/29/17</a:t>
             </a:fld>
             <a:endParaRPr lang="en-US" dirty="0"/>
           </a:p>
@@ -4573,7 +4573,7 @@
           <a:p>
             <a:fld id="{B1B4E7C4-4DA4-404D-9965-B13F2DD7D8BF}" type="datetimeFigureOut">
               <a:rPr lang="en-US" dirty="0"/>
-              <a:t>5/28/17</a:t>
+              <a:t>5/29/17</a:t>
             </a:fld>
             <a:endParaRPr lang="en-US" dirty="0"/>
           </a:p>
@@ -4686,7 +4686,7 @@
           <a:p>
             <a:fld id="{476FB7AA-4A53-424F-AD41-70827B6504BA}" type="datetimeFigureOut">
               <a:rPr lang="en-US" dirty="0"/>
-              <a:t>5/28/17</a:t>
+              <a:t>5/29/17</a:t>
             </a:fld>
             <a:endParaRPr lang="en-US" dirty="0"/>
           </a:p>
@@ -4776,7 +4776,7 @@
           <a:p>
             <a:fld id="{E7884882-FB12-4BC8-9960-9AD8104D7FAE}" type="datetimeFigureOut">
               <a:rPr lang="en-US" dirty="0"/>
-              <a:t>5/28/17</a:t>
+              <a:t>5/29/17</a:t>
             </a:fld>
             <a:endParaRPr lang="en-US" dirty="0"/>
           </a:p>
@@ -5044,7 +5044,7 @@
           <a:p>
             <a:fld id="{F7D1BD23-6E54-4D9D-AD88-A2813C73CC25}" type="datetimeFigureOut">
               <a:rPr lang="en-US" dirty="0"/>
-              <a:t>5/28/17</a:t>
+              <a:t>5/29/17</a:t>
             </a:fld>
             <a:endParaRPr lang="en-US" dirty="0"/>
           </a:p>
@@ -5320,7 +5320,7 @@
           <a:p>
             <a:fld id="{1471A834-4F3C-4AF9-9C74-05EC35A0F292}" type="datetimeFigureOut">
               <a:rPr lang="en-US" dirty="0"/>
-              <a:t>5/28/17</a:t>
+              <a:t>5/29/17</a:t>
             </a:fld>
             <a:endParaRPr lang="en-US" dirty="0"/>
           </a:p>
@@ -5555,7 +5555,7 @@
           <a:p>
             <a:fld id="{51CF1133-3259-4C45-BABA-5B62D9C6F78D}" type="datetimeFigureOut">
               <a:rPr lang="en-US" dirty="0"/>
-              <a:t>5/28/17</a:t>
+              <a:t>5/29/17</a:t>
             </a:fld>
             <a:endParaRPr lang="en-US" dirty="0"/>
           </a:p>
@@ -7180,7 +7180,6 @@
               <a:rPr lang="es-ES_tradnl" sz="4400" dirty="0"/>
               <a:t>.</a:t>
             </a:r>
-            <a:endParaRPr lang="es-ES_tradnl" sz="4400" dirty="0"/>
           </a:p>
         </p:txBody>
       </p:sp>
@@ -7846,7 +7845,6 @@
               <a:rPr lang="es-ES_tradnl" sz="2800" dirty="0"/>
               <a:t>Target&gt;</a:t>
             </a:r>
-            <a:endParaRPr lang="es-ES_tradnl" sz="2800" dirty="0"/>
           </a:p>
           <a:p>
             <a:endParaRPr lang="es-ES_tradnl" dirty="0"/>
@@ -8019,7 +8017,6 @@
               <a:rPr lang="es-ES_tradnl" sz="3600" dirty="0"/>
               <a:t> con las opciones de la línea de comandos adecuadas. Las opciones de la línea de comandos permiten establecer propiedades, ejecutar destinos específicos y especificar registradores.</a:t>
             </a:r>
-            <a:endParaRPr lang="es-ES_tradnl" sz="3600" dirty="0"/>
           </a:p>
         </p:txBody>
       </p:sp>
@@ -8292,7 +8289,6 @@
               <a:rPr lang="es-ES_tradnl" dirty="0"/>
               <a:t>Conceptos avanzados</a:t>
             </a:r>
-            <a:endParaRPr lang="es-ES_tradnl" dirty="0"/>
           </a:p>
         </p:txBody>
       </p:sp>
@@ -8324,7 +8320,6 @@
               <a:rPr lang="es-ES_tradnl" sz="3600" dirty="0"/>
               <a:t> se puede utilizar para realizar operaciones más avanzadas durante las compilaciones, como son el registro de errores, las advertencias, los mensajes para la consola y otros registradores, la realización de análisis de dependencia en los destinos y el procesamiento por lotes de tareas y destinos en metadatos de elementos.</a:t>
             </a:r>
-            <a:endParaRPr lang="es-ES_tradnl" sz="3600" dirty="0"/>
           </a:p>
         </p:txBody>
       </p:sp>
@@ -8385,7 +8380,6 @@
               <a:rPr lang="es-ES_tradnl" sz="6000" dirty="0"/>
               <a:t>Integración de Visual Studio</a:t>
             </a:r>
-            <a:endParaRPr lang="es-ES_tradnl" sz="6000" dirty="0"/>
           </a:p>
         </p:txBody>
       </p:sp>
@@ -8817,7 +8811,6 @@
               <a:rPr lang="es-ES_tradnl" sz="4000" dirty="0"/>
               <a:t> para generar proyectos administrados; es decir, un proyecto administrado se puede generar en Visual Studio y desde la línea de comandos (incluso sin tener Visual Studio instalado), con resultados idénticos.</a:t>
             </a:r>
-            <a:endParaRPr lang="es-ES_tradnl" sz="4000" dirty="0"/>
           </a:p>
         </p:txBody>
       </p:sp>
@@ -8946,7 +8939,7 @@
         <p:spPr/>
         <p:txBody>
           <a:bodyPr>
-            <a:normAutofit/>
+            <a:normAutofit fontScale="92500" lnSpcReduction="10000"/>
           </a:bodyPr>
           <a:lstStyle/>
           <a:p>
@@ -8954,15 +8947,15 @@
               <a:buNone/>
             </a:pPr>
             <a:r>
-              <a:rPr lang="es-ES_tradnl" sz="3200" dirty="0" smtClean="0"/>
+              <a:rPr lang="es-ES_tradnl" sz="3000" dirty="0" smtClean="0"/>
               <a:t>Página web sobre información general de </a:t>
             </a:r>
             <a:r>
-              <a:rPr lang="es-ES_tradnl" sz="3200" dirty="0" err="1" smtClean="0"/>
+              <a:rPr lang="es-ES_tradnl" sz="3000" dirty="0" err="1" smtClean="0"/>
               <a:t>MSBuild</a:t>
             </a:r>
             <a:r>
-              <a:rPr lang="es-ES_tradnl" sz="3200" dirty="0" smtClean="0"/>
+              <a:rPr lang="es-ES_tradnl" sz="3000" dirty="0" smtClean="0"/>
               <a:t>:</a:t>
             </a:r>
           </a:p>
@@ -8995,9 +8988,64 @@
               <a:buNone/>
             </a:pPr>
             <a:r>
-              <a:rPr lang="es-ES_tradnl" dirty="0" smtClean="0"/>
-              <a:t>Link de la presentación en GitHub:</a:t>
-            </a:r>
+              <a:rPr lang="es-ES_tradnl" sz="3000" dirty="0" smtClean="0"/>
+              <a:t>Link de la presentación en GitHub</a:t>
+            </a:r>
+            <a:r>
+              <a:rPr lang="es-ES_tradnl" sz="3000" dirty="0" smtClean="0"/>
+              <a:t>:</a:t>
+            </a:r>
+          </a:p>
+          <a:p>
+            <a:pPr marL="0" indent="0">
+              <a:buNone/>
+            </a:pPr>
+            <a:r>
+              <a:rPr lang="es-ES_tradnl" dirty="0" smtClean="0">
+                <a:hlinkClick r:id="rId3" invalidUrl="https://github.com/are883/HMIS2017/blob/master/Presentación HMIS/MSBuild in Visual Studio.pptx"/>
+              </a:rPr>
+              <a:t>https://github.com/are883/HMIS2017/blob/master/Presentación%20HMIS/MSBuild%20in%20Visual%20Studio.pptx</a:t>
+            </a:r>
+            <a:endParaRPr lang="es-ES_tradnl" dirty="0" smtClean="0"/>
+          </a:p>
+          <a:p>
+            <a:pPr marL="0" indent="0">
+              <a:buNone/>
+            </a:pPr>
+            <a:endParaRPr lang="es-ES_tradnl" dirty="0" smtClean="0"/>
+          </a:p>
+          <a:p>
+            <a:pPr marL="0" indent="0">
+              <a:buNone/>
+            </a:pPr>
+            <a:r>
+              <a:rPr lang="es-ES_tradnl" sz="3000" dirty="0" smtClean="0"/>
+              <a:t>Link de un documento más detallado sobre el tema:</a:t>
+            </a:r>
+          </a:p>
+          <a:p>
+            <a:pPr marL="0" indent="0">
+              <a:buNone/>
+            </a:pPr>
+            <a:r>
+              <a:rPr lang="es-ES_tradnl" dirty="0">
+                <a:hlinkClick r:id="rId4" invalidUrl="https://github.com/are883/HMIS2017/blob/master/Presentación HMIS/MSBuild en Visual Studio.pdf"/>
+              </a:rPr>
+              <a:t>https://</a:t>
+            </a:r>
+            <a:r>
+              <a:rPr lang="es-ES_tradnl" dirty="0" err="1">
+                <a:hlinkClick r:id="rId5" invalidUrl="https://github.com/are883/HMIS2017/blob/master/Presentación HMIS/MSBuild en Visual Studio.pdf"/>
+              </a:rPr>
+              <a:t>github.com</a:t>
+            </a:r>
+            <a:r>
+              <a:rPr lang="es-ES_tradnl" dirty="0">
+                <a:hlinkClick r:id="rId6" invalidUrl="https://github.com/are883/HMIS2017/blob/master/Presentación HMIS/MSBuild en Visual Studio.pdf"/>
+              </a:rPr>
+              <a:t>/are883/HMIS2017/blob/master/Presentación%20HMIS/MSBuild%20en%20Visual%20Studio.pdf</a:t>
+            </a:r>
+            <a:endParaRPr lang="es-ES_tradnl" dirty="0" smtClean="0"/>
           </a:p>
           <a:p>
             <a:pPr marL="0" indent="0">

</xml_diff>

<commit_message>
Introducción del link al video explicativo
</commit_message>
<xml_diff>
--- a/Presentación HMIS/MSBuild in Visual Studio.pptx
+++ b/Presentación HMIS/MSBuild in Visual Studio.pptx
@@ -229,7 +229,7 @@
           <a:p>
             <a:fld id="{822FEE0E-2986-8742-BCAD-017A2D98633F}" type="datetimeFigureOut">
               <a:rPr lang="es-ES_tradnl" smtClean="0"/>
-              <a:t>29/5/17</a:t>
+              <a:t>30/5/17</a:t>
             </a:fld>
             <a:endParaRPr lang="es-ES_tradnl"/>
           </a:p>
@@ -693,7 +693,7 @@
           <a:p>
             <a:fld id="{ECD19FB2-3AAB-4D03-B13A-2960828C78E3}" type="datetimeFigureOut">
               <a:rPr lang="en-US" dirty="0"/>
-              <a:t>5/29/17</a:t>
+              <a:t>5/30/17</a:t>
             </a:fld>
             <a:endParaRPr lang="en-US" dirty="0"/>
           </a:p>
@@ -970,7 +970,7 @@
           <a:p>
             <a:fld id="{1B80C674-7DFC-42FE-B9CD-82963CDB1557}" type="datetimeFigureOut">
               <a:rPr lang="en-US" dirty="0"/>
-              <a:t>5/29/17</a:t>
+              <a:t>5/30/17</a:t>
             </a:fld>
             <a:endParaRPr lang="en-US" dirty="0"/>
           </a:p>
@@ -1157,7 +1157,7 @@
           <a:p>
             <a:fld id="{2076456F-F47D-4F25-8053-2A695DA0CA7D}" type="datetimeFigureOut">
               <a:rPr lang="en-US" dirty="0"/>
-              <a:t>5/29/17</a:t>
+              <a:t>5/30/17</a:t>
             </a:fld>
             <a:endParaRPr lang="en-US" dirty="0"/>
           </a:p>
@@ -1413,7 +1413,7 @@
           <a:p>
             <a:fld id="{5D6C7379-69CC-4837-9905-BEBA22830C8A}" type="datetimeFigureOut">
               <a:rPr lang="en-US" dirty="0"/>
-              <a:t>5/29/17</a:t>
+              <a:t>5/30/17</a:t>
             </a:fld>
             <a:endParaRPr lang="en-US" dirty="0"/>
           </a:p>
@@ -1834,7 +1834,7 @@
           <a:p>
             <a:fld id="{49EB8B7E-8AEE-4F10-BFEE-C999AD004D36}" type="datetimeFigureOut">
               <a:rPr lang="en-US" dirty="0"/>
-              <a:t>5/29/17</a:t>
+              <a:t>5/30/17</a:t>
             </a:fld>
             <a:endParaRPr lang="en-US" dirty="0"/>
           </a:p>
@@ -2375,7 +2375,7 @@
           <a:p>
             <a:fld id="{8668F3F9-58BC-440B-B37B-805B9055EF92}" type="datetimeFigureOut">
               <a:rPr lang="en-US" dirty="0"/>
-              <a:t>5/29/17</a:t>
+              <a:t>5/30/17</a:t>
             </a:fld>
             <a:endParaRPr lang="en-US" dirty="0"/>
           </a:p>
@@ -3201,7 +3201,7 @@
           <a:p>
             <a:fld id="{0D5A53AF-48EA-489D-8260-9DCAB666386A}" type="datetimeFigureOut">
               <a:rPr lang="en-US" dirty="0"/>
-              <a:t>5/29/17</a:t>
+              <a:t>5/30/17</a:t>
             </a:fld>
             <a:endParaRPr lang="en-US" dirty="0"/>
           </a:p>
@@ -3366,7 +3366,7 @@
           <a:p>
             <a:fld id="{0DED02AE-B9A4-47BD-AF8E-97E16144138B}" type="datetimeFigureOut">
               <a:rPr lang="en-US" dirty="0"/>
-              <a:t>5/29/17</a:t>
+              <a:t>5/30/17</a:t>
             </a:fld>
             <a:endParaRPr lang="en-US" dirty="0"/>
           </a:p>
@@ -3541,7 +3541,7 @@
           <a:p>
             <a:fld id="{CF0FD78B-DB02-4362-BCDC-98A55456977C}" type="datetimeFigureOut">
               <a:rPr lang="en-US" dirty="0"/>
-              <a:t>5/29/17</a:t>
+              <a:t>5/30/17</a:t>
             </a:fld>
             <a:endParaRPr lang="en-US" dirty="0"/>
           </a:p>
@@ -3706,7 +3706,7 @@
           <a:p>
             <a:fld id="{99916976-5D93-46E4-A98A-FAD63E4D0EA8}" type="datetimeFigureOut">
               <a:rPr lang="en-US" dirty="0"/>
-              <a:t>5/29/17</a:t>
+              <a:t>5/30/17</a:t>
             </a:fld>
             <a:endParaRPr lang="en-US" dirty="0"/>
           </a:p>
@@ -3958,7 +3958,7 @@
           <a:p>
             <a:fld id="{0F39F4F5-F4D2-4D2A-AB60-88D37ADCB869}" type="datetimeFigureOut">
               <a:rPr lang="en-US" dirty="0"/>
-              <a:t>5/29/17</a:t>
+              <a:t>5/30/17</a:t>
             </a:fld>
             <a:endParaRPr lang="en-US" dirty="0"/>
           </a:p>
@@ -4185,7 +4185,7 @@
           <a:p>
             <a:fld id="{D23BC6CE-6D1E-47E5-8859-F31AC5380EB2}" type="datetimeFigureOut">
               <a:rPr lang="en-US" dirty="0"/>
-              <a:t>5/29/17</a:t>
+              <a:t>5/30/17</a:t>
             </a:fld>
             <a:endParaRPr lang="en-US" dirty="0"/>
           </a:p>
@@ -4573,7 +4573,7 @@
           <a:p>
             <a:fld id="{B1B4E7C4-4DA4-404D-9965-B13F2DD7D8BF}" type="datetimeFigureOut">
               <a:rPr lang="en-US" dirty="0"/>
-              <a:t>5/29/17</a:t>
+              <a:t>5/30/17</a:t>
             </a:fld>
             <a:endParaRPr lang="en-US" dirty="0"/>
           </a:p>
@@ -4686,7 +4686,7 @@
           <a:p>
             <a:fld id="{476FB7AA-4A53-424F-AD41-70827B6504BA}" type="datetimeFigureOut">
               <a:rPr lang="en-US" dirty="0"/>
-              <a:t>5/29/17</a:t>
+              <a:t>5/30/17</a:t>
             </a:fld>
             <a:endParaRPr lang="en-US" dirty="0"/>
           </a:p>
@@ -4776,7 +4776,7 @@
           <a:p>
             <a:fld id="{E7884882-FB12-4BC8-9960-9AD8104D7FAE}" type="datetimeFigureOut">
               <a:rPr lang="en-US" dirty="0"/>
-              <a:t>5/29/17</a:t>
+              <a:t>5/30/17</a:t>
             </a:fld>
             <a:endParaRPr lang="en-US" dirty="0"/>
           </a:p>
@@ -5044,7 +5044,7 @@
           <a:p>
             <a:fld id="{F7D1BD23-6E54-4D9D-AD88-A2813C73CC25}" type="datetimeFigureOut">
               <a:rPr lang="en-US" dirty="0"/>
-              <a:t>5/29/17</a:t>
+              <a:t>5/30/17</a:t>
             </a:fld>
             <a:endParaRPr lang="en-US" dirty="0"/>
           </a:p>
@@ -5320,7 +5320,7 @@
           <a:p>
             <a:fld id="{1471A834-4F3C-4AF9-9C74-05EC35A0F292}" type="datetimeFigureOut">
               <a:rPr lang="en-US" dirty="0"/>
-              <a:t>5/29/17</a:t>
+              <a:t>5/30/17</a:t>
             </a:fld>
             <a:endParaRPr lang="en-US" dirty="0"/>
           </a:p>
@@ -5555,7 +5555,7 @@
           <a:p>
             <a:fld id="{51CF1133-3259-4C45-BABA-5B62D9C6F78D}" type="datetimeFigureOut">
               <a:rPr lang="en-US" dirty="0"/>
-              <a:t>5/29/17</a:t>
+              <a:t>5/30/17</a:t>
             </a:fld>
             <a:endParaRPr lang="en-US" dirty="0"/>
           </a:p>
@@ -6197,7 +6197,11 @@
           <a:p>
             <a:r>
               <a:rPr lang="es-ES_tradnl" dirty="0" smtClean="0"/>
-              <a:t>Realizado por Adrián Rodríguez Escudero</a:t>
+              <a:t>Realizado por Adrián </a:t>
+            </a:r>
+            <a:r>
+              <a:rPr lang="es-ES_tradnl" dirty="0" smtClean="0"/>
+              <a:t>Rodríguez Escudero</a:t>
             </a:r>
             <a:endParaRPr lang="es-ES_tradnl" dirty="0"/>
           </a:p>
@@ -6213,13 +6217,13 @@
   <p:clrMapOvr>
     <a:masterClrMapping/>
   </p:clrMapOvr>
-  <mc:AlternateContent xmlns:mc="http://schemas.openxmlformats.org/markup-compatibility/2006">
-    <mc:Choice xmlns:p14="http://schemas.microsoft.com/office/powerpoint/2010/main" Requires="p14">
+  <mc:AlternateContent xmlns:mc="http://schemas.openxmlformats.org/markup-compatibility/2006" xmlns:p14="http://schemas.microsoft.com/office/powerpoint/2010/main">
+    <mc:Choice Requires="p14">
       <p:transition spd="slow" p14:dur="3400">
         <p14:reveal/>
       </p:transition>
     </mc:Choice>
-    <mc:Fallback>
+    <mc:Fallback xmlns="">
       <p:transition spd="slow">
         <p:fade/>
       </p:transition>
@@ -6419,13 +6423,13 @@
   <p:clrMapOvr>
     <a:masterClrMapping/>
   </p:clrMapOvr>
-  <mc:AlternateContent xmlns:mc="http://schemas.openxmlformats.org/markup-compatibility/2006">
-    <mc:Choice xmlns:p159="http://schemas.microsoft.com/office/powerpoint/2015/09/main" Requires="p159">
+  <mc:AlternateContent xmlns:mc="http://schemas.openxmlformats.org/markup-compatibility/2006" xmlns:p159="http://schemas.microsoft.com/office/powerpoint/2015/09/main">
+    <mc:Choice Requires="p159">
       <p:transition xmlns:p14="http://schemas.microsoft.com/office/powerpoint/2010/main" spd="slow" p14:dur="2000">
         <p159:morph option="byObject"/>
       </p:transition>
     </mc:Choice>
-    <mc:Fallback>
+    <mc:Fallback xmlns="">
       <p:transition spd="slow">
         <p:fade/>
       </p:transition>
@@ -6499,13 +6503,13 @@
   <p:clrMapOvr>
     <a:masterClrMapping/>
   </p:clrMapOvr>
-  <mc:AlternateContent xmlns:mc="http://schemas.openxmlformats.org/markup-compatibility/2006">
-    <mc:Choice xmlns:p159="http://schemas.microsoft.com/office/powerpoint/2015/09/main" Requires="p159">
-      <p:transition xmlns:p14="http://schemas.microsoft.com/office/powerpoint/2010/main" spd="slow" p14:dur="2000">
-        <p159:morph option="byObject"/>
+  <mc:AlternateContent xmlns:mc="http://schemas.openxmlformats.org/markup-compatibility/2006" xmlns:p14="http://schemas.microsoft.com/office/powerpoint/2010/main">
+    <mc:Choice Requires="p14">
+      <p:transition spd="slow" p14:dur="3400">
+        <p14:reveal/>
       </p:transition>
     </mc:Choice>
-    <mc:Fallback>
+    <mc:Fallback xmlns="">
       <p:transition spd="slow">
         <p:fade/>
       </p:transition>
@@ -6609,13 +6613,13 @@
   <p:clrMapOvr>
     <a:masterClrMapping/>
   </p:clrMapOvr>
-  <mc:AlternateContent xmlns:mc="http://schemas.openxmlformats.org/markup-compatibility/2006">
-    <mc:Choice xmlns:p159="http://schemas.microsoft.com/office/powerpoint/2015/09/main" Requires="p159">
+  <mc:AlternateContent xmlns:mc="http://schemas.openxmlformats.org/markup-compatibility/2006" xmlns:p159="http://schemas.microsoft.com/office/powerpoint/2015/09/main">
+    <mc:Choice Requires="p159">
       <p:transition xmlns:p14="http://schemas.microsoft.com/office/powerpoint/2010/main" spd="slow" p14:dur="2000">
-        <p159:morph option="byObject"/>
+        <p159:morph option="byWord"/>
       </p:transition>
     </mc:Choice>
-    <mc:Fallback>
+    <mc:Fallback xmlns="">
       <p:transition spd="slow">
         <p:fade/>
       </p:transition>
@@ -6757,13 +6761,13 @@
   <p:clrMapOvr>
     <a:masterClrMapping/>
   </p:clrMapOvr>
-  <mc:AlternateContent xmlns:mc="http://schemas.openxmlformats.org/markup-compatibility/2006">
-    <mc:Choice xmlns:p159="http://schemas.microsoft.com/office/powerpoint/2015/09/main" Requires="p159">
+  <mc:AlternateContent xmlns:mc="http://schemas.openxmlformats.org/markup-compatibility/2006" xmlns:p159="http://schemas.microsoft.com/office/powerpoint/2015/09/main">
+    <mc:Choice Requires="p159">
       <p:transition xmlns:p14="http://schemas.microsoft.com/office/powerpoint/2010/main" spd="slow" p14:dur="2000">
         <p159:morph option="byObject"/>
       </p:transition>
     </mc:Choice>
-    <mc:Fallback>
+    <mc:Fallback xmlns="">
       <p:transition spd="slow">
         <p:fade/>
       </p:transition>
@@ -6863,13 +6867,13 @@
   <p:clrMapOvr>
     <a:masterClrMapping/>
   </p:clrMapOvr>
-  <mc:AlternateContent xmlns:mc="http://schemas.openxmlformats.org/markup-compatibility/2006">
-    <mc:Choice xmlns:p159="http://schemas.microsoft.com/office/powerpoint/2015/09/main" Requires="p159">
+  <mc:AlternateContent xmlns:mc="http://schemas.openxmlformats.org/markup-compatibility/2006" xmlns:p159="http://schemas.microsoft.com/office/powerpoint/2015/09/main">
+    <mc:Choice Requires="p159">
       <p:transition xmlns:p14="http://schemas.microsoft.com/office/powerpoint/2010/main" spd="slow" p14:dur="2000">
         <p159:morph option="byObject"/>
       </p:transition>
     </mc:Choice>
-    <mc:Fallback>
+    <mc:Fallback xmlns="">
       <p:transition spd="slow">
         <p:fade/>
       </p:transition>
@@ -7061,13 +7065,13 @@
   <p:clrMapOvr>
     <a:masterClrMapping/>
   </p:clrMapOvr>
-  <mc:AlternateContent xmlns:mc="http://schemas.openxmlformats.org/markup-compatibility/2006">
-    <mc:Choice xmlns:p159="http://schemas.microsoft.com/office/powerpoint/2015/09/main" Requires="p159">
+  <mc:AlternateContent xmlns:mc="http://schemas.openxmlformats.org/markup-compatibility/2006" xmlns:p159="http://schemas.microsoft.com/office/powerpoint/2015/09/main">
+    <mc:Choice Requires="p159">
       <p:transition xmlns:p14="http://schemas.microsoft.com/office/powerpoint/2010/main" spd="slow" p14:dur="2000">
         <p159:morph option="byObject"/>
       </p:transition>
     </mc:Choice>
-    <mc:Fallback>
+    <mc:Fallback xmlns="">
       <p:transition spd="slow">
         <p:fade/>
       </p:transition>
@@ -7141,13 +7145,13 @@
   <p:clrMapOvr>
     <a:masterClrMapping/>
   </p:clrMapOvr>
-  <mc:AlternateContent xmlns:mc="http://schemas.openxmlformats.org/markup-compatibility/2006">
-    <mc:Choice xmlns:p159="http://schemas.microsoft.com/office/powerpoint/2015/09/main" Requires="p159">
-      <p:transition xmlns:p14="http://schemas.microsoft.com/office/powerpoint/2010/main" spd="slow" p14:dur="2000">
-        <p159:morph option="byObject"/>
+  <mc:AlternateContent xmlns:mc="http://schemas.openxmlformats.org/markup-compatibility/2006" xmlns:p14="http://schemas.microsoft.com/office/powerpoint/2010/main">
+    <mc:Choice Requires="p14">
+      <p:transition spd="slow" p14:dur="3400">
+        <p14:reveal/>
       </p:transition>
     </mc:Choice>
-    <mc:Fallback>
+    <mc:Fallback xmlns="">
       <p:transition spd="slow">
         <p:fade/>
       </p:transition>
@@ -7253,13 +7257,13 @@
   <p:clrMapOvr>
     <a:masterClrMapping/>
   </p:clrMapOvr>
-  <mc:AlternateContent xmlns:mc="http://schemas.openxmlformats.org/markup-compatibility/2006">
-    <mc:Choice xmlns:p159="http://schemas.microsoft.com/office/powerpoint/2015/09/main" Requires="p159">
+  <mc:AlternateContent xmlns:mc="http://schemas.openxmlformats.org/markup-compatibility/2006" xmlns:p159="http://schemas.microsoft.com/office/powerpoint/2015/09/main">
+    <mc:Choice Requires="p159">
       <p:transition xmlns:p14="http://schemas.microsoft.com/office/powerpoint/2010/main" spd="slow" p14:dur="2000">
-        <p159:morph option="byObject"/>
+        <p159:morph option="byWord"/>
       </p:transition>
     </mc:Choice>
-    <mc:Fallback>
+    <mc:Fallback xmlns="">
       <p:transition spd="slow">
         <p:fade/>
       </p:transition>
@@ -7364,13 +7368,13 @@
   <p:clrMapOvr>
     <a:masterClrMapping/>
   </p:clrMapOvr>
-  <mc:AlternateContent xmlns:mc="http://schemas.openxmlformats.org/markup-compatibility/2006">
-    <mc:Choice xmlns:p159="http://schemas.microsoft.com/office/powerpoint/2015/09/main" Requires="p159">
+  <mc:AlternateContent xmlns:mc="http://schemas.openxmlformats.org/markup-compatibility/2006" xmlns:p159="http://schemas.microsoft.com/office/powerpoint/2015/09/main">
+    <mc:Choice Requires="p159">
       <p:transition xmlns:p14="http://schemas.microsoft.com/office/powerpoint/2010/main" spd="slow" p14:dur="2000">
         <p159:morph option="byObject"/>
       </p:transition>
     </mc:Choice>
-    <mc:Fallback>
+    <mc:Fallback xmlns="">
       <p:transition spd="slow">
         <p:fade/>
       </p:transition>
@@ -7578,13 +7582,13 @@
   <p:clrMapOvr>
     <a:masterClrMapping/>
   </p:clrMapOvr>
-  <mc:AlternateContent xmlns:mc="http://schemas.openxmlformats.org/markup-compatibility/2006">
-    <mc:Choice xmlns:p159="http://schemas.microsoft.com/office/powerpoint/2015/09/main" Requires="p159">
+  <mc:AlternateContent xmlns:mc="http://schemas.openxmlformats.org/markup-compatibility/2006" xmlns:p159="http://schemas.microsoft.com/office/powerpoint/2015/09/main">
+    <mc:Choice Requires="p159">
       <p:transition xmlns:p14="http://schemas.microsoft.com/office/powerpoint/2010/main" spd="slow" p14:dur="2000">
         <p159:morph option="byObject"/>
       </p:transition>
     </mc:Choice>
-    <mc:Fallback>
+    <mc:Fallback xmlns="">
       <p:transition spd="slow">
         <p:fade/>
       </p:transition>
@@ -7665,13 +7669,13 @@
   <p:clrMapOvr>
     <a:masterClrMapping/>
   </p:clrMapOvr>
-  <mc:AlternateContent xmlns:mc="http://schemas.openxmlformats.org/markup-compatibility/2006">
-    <mc:Choice xmlns:p159="http://schemas.microsoft.com/office/powerpoint/2015/09/main" Requires="p159">
-      <p:transition xmlns:p14="http://schemas.microsoft.com/office/powerpoint/2010/main" spd="slow" p14:dur="2000">
-        <p159:morph option="byObject"/>
+  <mc:AlternateContent xmlns:mc="http://schemas.openxmlformats.org/markup-compatibility/2006" xmlns:p14="http://schemas.microsoft.com/office/powerpoint/2010/main">
+    <mc:Choice Requires="p14">
+      <p:transition spd="slow" p14:dur="3400">
+        <p14:reveal/>
       </p:transition>
     </mc:Choice>
-    <mc:Fallback>
+    <mc:Fallback xmlns="">
       <p:transition spd="slow">
         <p:fade/>
       </p:transition>
@@ -7745,13 +7749,13 @@
   <p:clrMapOvr>
     <a:masterClrMapping/>
   </p:clrMapOvr>
-  <mc:AlternateContent xmlns:mc="http://schemas.openxmlformats.org/markup-compatibility/2006">
-    <mc:Choice xmlns:p159="http://schemas.microsoft.com/office/powerpoint/2015/09/main" Requires="p159">
-      <p:transition xmlns:p14="http://schemas.microsoft.com/office/powerpoint/2010/main" spd="slow" p14:dur="2000">
-        <p159:morph option="byObject"/>
+  <mc:AlternateContent xmlns:mc="http://schemas.openxmlformats.org/markup-compatibility/2006" xmlns:p14="http://schemas.microsoft.com/office/powerpoint/2010/main">
+    <mc:Choice Requires="p14">
+      <p:transition spd="slow" p14:dur="3400">
+        <p14:reveal/>
       </p:transition>
     </mc:Choice>
-    <mc:Fallback>
+    <mc:Fallback xmlns="">
       <p:transition spd="slow">
         <p:fade/>
       </p:transition>
@@ -7863,13 +7867,13 @@
   <p:clrMapOvr>
     <a:masterClrMapping/>
   </p:clrMapOvr>
-  <mc:AlternateContent xmlns:mc="http://schemas.openxmlformats.org/markup-compatibility/2006">
-    <mc:Choice xmlns:p159="http://schemas.microsoft.com/office/powerpoint/2015/09/main" Requires="p159">
+  <mc:AlternateContent xmlns:mc="http://schemas.openxmlformats.org/markup-compatibility/2006" xmlns:p159="http://schemas.microsoft.com/office/powerpoint/2015/09/main">
+    <mc:Choice Requires="p159">
       <p:transition xmlns:p14="http://schemas.microsoft.com/office/powerpoint/2010/main" spd="slow" p14:dur="2000">
-        <p159:morph option="byObject"/>
+        <p159:morph option="byWord"/>
       </p:transition>
     </mc:Choice>
-    <mc:Fallback>
+    <mc:Fallback xmlns="">
       <p:transition spd="slow">
         <p:fade/>
       </p:transition>
@@ -7970,13 +7974,13 @@
   <p:clrMapOvr>
     <a:masterClrMapping/>
   </p:clrMapOvr>
-  <mc:AlternateContent xmlns:mc="http://schemas.openxmlformats.org/markup-compatibility/2006">
-    <mc:Choice xmlns:p159="http://schemas.microsoft.com/office/powerpoint/2015/09/main" Requires="p159">
+  <mc:AlternateContent xmlns:mc="http://schemas.openxmlformats.org/markup-compatibility/2006" xmlns:p159="http://schemas.microsoft.com/office/powerpoint/2015/09/main">
+    <mc:Choice Requires="p159">
       <p:transition xmlns:p14="http://schemas.microsoft.com/office/powerpoint/2010/main" spd="slow" p14:dur="2000">
         <p159:morph option="byObject"/>
       </p:transition>
     </mc:Choice>
-    <mc:Fallback>
+    <mc:Fallback xmlns="">
       <p:transition spd="slow">
         <p:fade/>
       </p:transition>
@@ -8146,13 +8150,13 @@
   <p:clrMapOvr>
     <a:masterClrMapping/>
   </p:clrMapOvr>
-  <mc:AlternateContent xmlns:mc="http://schemas.openxmlformats.org/markup-compatibility/2006">
-    <mc:Choice xmlns:p159="http://schemas.microsoft.com/office/powerpoint/2015/09/main" Requires="p159">
+  <mc:AlternateContent xmlns:mc="http://schemas.openxmlformats.org/markup-compatibility/2006" xmlns:p159="http://schemas.microsoft.com/office/powerpoint/2015/09/main">
+    <mc:Choice Requires="p159">
       <p:transition xmlns:p14="http://schemas.microsoft.com/office/powerpoint/2010/main" spd="slow" p14:dur="2000">
         <p159:morph option="byObject"/>
       </p:transition>
     </mc:Choice>
-    <mc:Fallback>
+    <mc:Fallback xmlns="">
       <p:transition spd="slow">
         <p:fade/>
       </p:transition>
@@ -8234,13 +8238,13 @@
   <p:clrMapOvr>
     <a:masterClrMapping/>
   </p:clrMapOvr>
-  <mc:AlternateContent xmlns:mc="http://schemas.openxmlformats.org/markup-compatibility/2006">
-    <mc:Choice xmlns:p159="http://schemas.microsoft.com/office/powerpoint/2015/09/main" Requires="p159">
-      <p:transition xmlns:p14="http://schemas.microsoft.com/office/powerpoint/2010/main" spd="slow" p14:dur="2000">
-        <p159:morph option="byObject"/>
+  <mc:AlternateContent xmlns:mc="http://schemas.openxmlformats.org/markup-compatibility/2006" xmlns:p14="http://schemas.microsoft.com/office/powerpoint/2010/main">
+    <mc:Choice Requires="p14">
+      <p:transition spd="slow" p14:dur="3400">
+        <p14:reveal/>
       </p:transition>
     </mc:Choice>
-    <mc:Fallback>
+    <mc:Fallback xmlns="">
       <p:transition spd="slow">
         <p:fade/>
       </p:transition>
@@ -8300,7 +8304,6 @@
               <a:rPr lang="es-ES_tradnl" dirty="0"/>
               <a:t>?</a:t>
             </a:r>
-            <a:endParaRPr lang="es-ES_tradnl" dirty="0"/>
           </a:p>
         </p:txBody>
       </p:sp>
@@ -8357,13 +8360,13 @@
   <p:clrMapOvr>
     <a:masterClrMapping/>
   </p:clrMapOvr>
-  <mc:AlternateContent xmlns:mc="http://schemas.openxmlformats.org/markup-compatibility/2006">
-    <mc:Choice xmlns:p159="http://schemas.microsoft.com/office/powerpoint/2015/09/main" Requires="p159">
+  <mc:AlternateContent xmlns:mc="http://schemas.openxmlformats.org/markup-compatibility/2006" xmlns:p159="http://schemas.microsoft.com/office/powerpoint/2015/09/main">
+    <mc:Choice Requires="p159">
       <p:transition xmlns:p14="http://schemas.microsoft.com/office/powerpoint/2010/main" spd="slow" p14:dur="2000">
-        <p159:morph option="byObject"/>
+        <p159:morph option="byWord"/>
       </p:transition>
     </mc:Choice>
-    <mc:Fallback>
+    <mc:Fallback xmlns="">
       <p:transition spd="slow">
         <p:fade/>
       </p:transition>
@@ -8536,13 +8539,13 @@
   <p:clrMapOvr>
     <a:masterClrMapping/>
   </p:clrMapOvr>
-  <mc:AlternateContent xmlns:mc="http://schemas.openxmlformats.org/markup-compatibility/2006">
-    <mc:Choice xmlns:p159="http://schemas.microsoft.com/office/powerpoint/2015/09/main" Requires="p159">
+  <mc:AlternateContent xmlns:mc="http://schemas.openxmlformats.org/markup-compatibility/2006" xmlns:p159="http://schemas.microsoft.com/office/powerpoint/2015/09/main">
+    <mc:Choice Requires="p159">
       <p:transition xmlns:p14="http://schemas.microsoft.com/office/powerpoint/2010/main" spd="slow" p14:dur="2000">
         <p159:morph option="byObject"/>
       </p:transition>
     </mc:Choice>
-    <mc:Fallback>
+    <mc:Fallback xmlns="">
       <p:transition spd="slow">
         <p:fade/>
       </p:transition>
@@ -8615,13 +8618,13 @@
   <p:clrMapOvr>
     <a:masterClrMapping/>
   </p:clrMapOvr>
-  <mc:AlternateContent xmlns:mc="http://schemas.openxmlformats.org/markup-compatibility/2006">
-    <mc:Choice xmlns:p159="http://schemas.microsoft.com/office/powerpoint/2015/09/main" Requires="p159">
-      <p:transition xmlns:p14="http://schemas.microsoft.com/office/powerpoint/2010/main" spd="slow" p14:dur="2000">
-        <p159:morph option="byObject"/>
+  <mc:AlternateContent xmlns:mc="http://schemas.openxmlformats.org/markup-compatibility/2006" xmlns:p14="http://schemas.microsoft.com/office/powerpoint/2010/main">
+    <mc:Choice Requires="p14">
+      <p:transition spd="slow" p14:dur="3400">
+        <p14:reveal/>
       </p:transition>
     </mc:Choice>
-    <mc:Fallback>
+    <mc:Fallback xmlns="">
       <p:transition spd="slow">
         <p:fade/>
       </p:transition>
@@ -8717,13 +8720,13 @@
   <p:clrMapOvr>
     <a:masterClrMapping/>
   </p:clrMapOvr>
-  <mc:AlternateContent xmlns:mc="http://schemas.openxmlformats.org/markup-compatibility/2006">
-    <mc:Choice xmlns:p159="http://schemas.microsoft.com/office/powerpoint/2015/09/main" Requires="p159">
+  <mc:AlternateContent xmlns:mc="http://schemas.openxmlformats.org/markup-compatibility/2006" xmlns:p159="http://schemas.microsoft.com/office/powerpoint/2015/09/main">
+    <mc:Choice Requires="p159">
       <p:transition xmlns:p14="http://schemas.microsoft.com/office/powerpoint/2010/main" spd="slow" p14:dur="2000">
-        <p159:morph option="byObject"/>
+        <p159:morph option="byWord"/>
       </p:transition>
     </mc:Choice>
-    <mc:Fallback>
+    <mc:Fallback xmlns="">
       <p:transition spd="slow">
         <p:fade/>
       </p:transition>
@@ -8796,13 +8799,13 @@
   <p:clrMapOvr>
     <a:masterClrMapping/>
   </p:clrMapOvr>
-  <mc:AlternateContent xmlns:mc="http://schemas.openxmlformats.org/markup-compatibility/2006">
-    <mc:Choice xmlns:p159="http://schemas.microsoft.com/office/powerpoint/2015/09/main" Requires="p159">
-      <p:transition xmlns:p14="http://schemas.microsoft.com/office/powerpoint/2010/main" spd="slow" p14:dur="2000">
-        <p159:morph option="byObject"/>
+  <mc:AlternateContent xmlns:mc="http://schemas.openxmlformats.org/markup-compatibility/2006" xmlns:p14="http://schemas.microsoft.com/office/powerpoint/2010/main">
+    <mc:Choice Requires="p14">
+      <p:transition spd="slow" p14:dur="3400">
+        <p14:reveal/>
       </p:transition>
     </mc:Choice>
-    <mc:Fallback>
+    <mc:Fallback xmlns="">
       <p:transition spd="slow">
         <p:fade/>
       </p:transition>
@@ -9050,13 +9053,13 @@
   <p:clrMapOvr>
     <a:masterClrMapping/>
   </p:clrMapOvr>
-  <mc:AlternateContent xmlns:mc="http://schemas.openxmlformats.org/markup-compatibility/2006">
-    <mc:Choice xmlns:p159="http://schemas.microsoft.com/office/powerpoint/2015/09/main" Requires="p159">
+  <mc:AlternateContent xmlns:mc="http://schemas.openxmlformats.org/markup-compatibility/2006" xmlns:p159="http://schemas.microsoft.com/office/powerpoint/2015/09/main">
+    <mc:Choice Requires="p159">
       <p:transition xmlns:p14="http://schemas.microsoft.com/office/powerpoint/2010/main" spd="slow" p14:dur="2000">
-        <p159:morph option="byObject"/>
+        <p159:morph option="byWord"/>
       </p:transition>
     </mc:Choice>
-    <mc:Fallback>
+    <mc:Fallback xmlns="">
       <p:transition spd="slow">
         <p:fade/>
       </p:transition>
@@ -9169,13 +9172,13 @@
   <p:clrMapOvr>
     <a:masterClrMapping/>
   </p:clrMapOvr>
-  <mc:AlternateContent xmlns:mc="http://schemas.openxmlformats.org/markup-compatibility/2006">
-    <mc:Choice xmlns:p159="http://schemas.microsoft.com/office/powerpoint/2015/09/main" Requires="p159">
+  <mc:AlternateContent xmlns:mc="http://schemas.openxmlformats.org/markup-compatibility/2006" xmlns:p159="http://schemas.microsoft.com/office/powerpoint/2015/09/main">
+    <mc:Choice Requires="p159">
       <p:transition xmlns:p14="http://schemas.microsoft.com/office/powerpoint/2010/main" spd="slow" p14:dur="2000">
-        <p159:morph option="byObject"/>
+        <p159:morph option="byWord"/>
       </p:transition>
     </mc:Choice>
-    <mc:Fallback>
+    <mc:Fallback xmlns="">
       <p:transition spd="slow">
         <p:fade/>
       </p:transition>
@@ -9284,13 +9287,13 @@
   <p:clrMapOvr>
     <a:masterClrMapping/>
   </p:clrMapOvr>
-  <mc:AlternateContent xmlns:mc="http://schemas.openxmlformats.org/markup-compatibility/2006">
-    <mc:Choice xmlns:p159="http://schemas.microsoft.com/office/powerpoint/2015/09/main" Requires="p159">
+  <mc:AlternateContent xmlns:mc="http://schemas.openxmlformats.org/markup-compatibility/2006" xmlns:p159="http://schemas.microsoft.com/office/powerpoint/2015/09/main">
+    <mc:Choice Requires="p159">
       <p:transition xmlns:p14="http://schemas.microsoft.com/office/powerpoint/2010/main" spd="slow" p14:dur="2000">
         <p159:morph option="byObject"/>
       </p:transition>
     </mc:Choice>
-    <mc:Fallback>
+    <mc:Fallback xmlns="">
       <p:transition spd="slow">
         <p:fade/>
       </p:transition>
@@ -9362,13 +9365,13 @@
   <p:clrMapOvr>
     <a:masterClrMapping/>
   </p:clrMapOvr>
-  <mc:AlternateContent xmlns:mc="http://schemas.openxmlformats.org/markup-compatibility/2006">
-    <mc:Choice xmlns:p159="http://schemas.microsoft.com/office/powerpoint/2015/09/main" Requires="p159">
-      <p:transition xmlns:p14="http://schemas.microsoft.com/office/powerpoint/2010/main" spd="slow" p14:dur="2000">
-        <p159:morph option="byObject"/>
+  <mc:AlternateContent xmlns:mc="http://schemas.openxmlformats.org/markup-compatibility/2006" xmlns:p14="http://schemas.microsoft.com/office/powerpoint/2010/main">
+    <mc:Choice Requires="p14">
+      <p:transition spd="slow" p14:dur="3400">
+        <p14:reveal/>
       </p:transition>
     </mc:Choice>
-    <mc:Fallback>
+    <mc:Fallback xmlns="">
       <p:transition spd="slow">
         <p:fade/>
       </p:transition>
@@ -9434,10 +9437,15 @@
             <p:ph idx="1"/>
           </p:nvPr>
         </p:nvSpPr>
-        <p:spPr/>
+        <p:spPr>
+          <a:xfrm>
+            <a:off x="1120000" y="1690688"/>
+            <a:ext cx="10233800" cy="4530818"/>
+          </a:xfrm>
+        </p:spPr>
         <p:txBody>
           <a:bodyPr>
-            <a:normAutofit fontScale="92500" lnSpcReduction="10000"/>
+            <a:normAutofit fontScale="77500" lnSpcReduction="20000"/>
           </a:bodyPr>
           <a:lstStyle/>
           <a:p>
@@ -9445,15 +9453,15 @@
               <a:buNone/>
             </a:pPr>
             <a:r>
-              <a:rPr lang="es-ES_tradnl" sz="3000" dirty="0" smtClean="0"/>
+              <a:rPr lang="es-ES_tradnl" sz="3100" dirty="0" smtClean="0"/>
               <a:t>Página web sobre información general de </a:t>
             </a:r>
             <a:r>
-              <a:rPr lang="es-ES_tradnl" sz="3000" dirty="0" err="1" smtClean="0"/>
+              <a:rPr lang="es-ES_tradnl" sz="3100" dirty="0" err="1" smtClean="0"/>
               <a:t>MSBuild</a:t>
             </a:r>
             <a:r>
-              <a:rPr lang="es-ES_tradnl" sz="3000" dirty="0" smtClean="0"/>
+              <a:rPr lang="es-ES_tradnl" sz="3100" dirty="0" smtClean="0"/>
               <a:t>:</a:t>
             </a:r>
           </a:p>
@@ -9462,18 +9470,51 @@
               <a:buNone/>
             </a:pPr>
             <a:r>
-              <a:rPr lang="es-ES_tradnl" dirty="0">
+              <a:rPr lang="es-ES_tradnl" sz="2600" dirty="0">
                 <a:hlinkClick r:id="rId2"/>
               </a:rPr>
               <a:t>https://msdn.microsoft.com/es-es/library/ms171452(v=vs.90).</a:t>
             </a:r>
             <a:r>
-              <a:rPr lang="es-ES_tradnl" dirty="0" smtClean="0">
+              <a:rPr lang="es-ES_tradnl" sz="2600" dirty="0" smtClean="0">
                 <a:hlinkClick r:id="rId2"/>
               </a:rPr>
               <a:t>aspx</a:t>
             </a:r>
+            <a:endParaRPr lang="es-ES_tradnl" sz="2600" dirty="0" smtClean="0"/>
+          </a:p>
+          <a:p>
+            <a:pPr marL="0" indent="0">
+              <a:buNone/>
+            </a:pPr>
             <a:endParaRPr lang="es-ES_tradnl" dirty="0" smtClean="0"/>
+          </a:p>
+          <a:p>
+            <a:pPr marL="0" indent="0">
+              <a:buNone/>
+            </a:pPr>
+            <a:r>
+              <a:rPr lang="es-ES_tradnl" sz="3100" dirty="0" smtClean="0"/>
+              <a:t>Link a un video explicativo de la herramienta:</a:t>
+            </a:r>
+          </a:p>
+          <a:p>
+            <a:pPr marL="0" indent="0">
+              <a:buNone/>
+            </a:pPr>
+            <a:r>
+              <a:rPr lang="es-ES_tradnl" sz="2600" dirty="0">
+                <a:hlinkClick r:id="rId3"/>
+              </a:rPr>
+              <a:t>https://</a:t>
+            </a:r>
+            <a:r>
+              <a:rPr lang="es-ES_tradnl" sz="2600" dirty="0" smtClean="0">
+                <a:hlinkClick r:id="rId3"/>
+              </a:rPr>
+              <a:t>www.youtube.com/watch?v=tnGM8yfRDuo</a:t>
+            </a:r>
+            <a:endParaRPr lang="es-ES_tradnl" sz="2600" dirty="0" smtClean="0"/>
           </a:p>
           <a:p>
             <a:pPr marL="0" indent="0">
@@ -9486,7 +9527,7 @@
               <a:buNone/>
             </a:pPr>
             <a:r>
-              <a:rPr lang="es-ES_tradnl" sz="3000" dirty="0" smtClean="0"/>
+              <a:rPr lang="es-ES_tradnl" sz="3100" dirty="0" smtClean="0"/>
               <a:t>Link de la presentación en GitHub:</a:t>
             </a:r>
           </a:p>
@@ -9495,12 +9536,12 @@
               <a:buNone/>
             </a:pPr>
             <a:r>
-              <a:rPr lang="es-ES_tradnl" dirty="0" smtClean="0">
-                <a:hlinkClick r:id="rId3" invalidUrl="https://github.com/are883/HMIS2017/blob/master/Presentación HMIS/MSBuild in Visual Studio.pptx"/>
+              <a:rPr lang="es-ES_tradnl" sz="2600" dirty="0" smtClean="0">
+                <a:hlinkClick r:id="rId4" invalidUrl="https://github.com/are883/HMIS2017/blob/master/Presentación HMIS/MSBuild in Visual Studio.pptx"/>
               </a:rPr>
               <a:t>https://github.com/are883/HMIS2017/blob/master/Presentación%20HMIS/MSBuild%20in%20Visual%20Studio.pptx</a:t>
             </a:r>
-            <a:endParaRPr lang="es-ES_tradnl" dirty="0" smtClean="0"/>
+            <a:endParaRPr lang="es-ES_tradnl" sz="2600" dirty="0" smtClean="0"/>
           </a:p>
           <a:p>
             <a:pPr marL="0" indent="0">
@@ -9513,7 +9554,7 @@
               <a:buNone/>
             </a:pPr>
             <a:r>
-              <a:rPr lang="es-ES_tradnl" sz="3000" dirty="0" smtClean="0"/>
+              <a:rPr lang="es-ES_tradnl" sz="3100" dirty="0" smtClean="0"/>
               <a:t>Link de un documento más detallado sobre el tema:</a:t>
             </a:r>
           </a:p>
@@ -9522,35 +9563,23 @@
               <a:buNone/>
             </a:pPr>
             <a:r>
-              <a:rPr lang="es-ES_tradnl" dirty="0">
-                <a:hlinkClick r:id="rId4" invalidUrl="https://github.com/are883/HMIS2017/blob/master/Presentación HMIS/MSBuild en Visual Studio.pdf"/>
+              <a:rPr lang="es-ES_tradnl" sz="2600" dirty="0">
+                <a:hlinkClick r:id="rId5" invalidUrl="https://github.com/are883/HMIS2017/blob/master/Presentación HMIS/MSBuild en Visual Studio.pdf"/>
               </a:rPr>
               <a:t>https://</a:t>
             </a:r>
             <a:r>
-              <a:rPr lang="es-ES_tradnl" dirty="0" err="1">
-                <a:hlinkClick r:id="rId5" invalidUrl="https://github.com/are883/HMIS2017/blob/master/Presentación HMIS/MSBuild en Visual Studio.pdf"/>
+              <a:rPr lang="es-ES_tradnl" sz="2600" dirty="0" smtClean="0">
+                <a:hlinkClick r:id="rId6" invalidUrl="https://github.com/are883/HMIS2017/blob/master/Presentación HMIS/MSBuild en Visual Studio.pdf"/>
               </a:rPr>
               <a:t>github.com</a:t>
             </a:r>
             <a:r>
-              <a:rPr lang="es-ES_tradnl" dirty="0">
-                <a:hlinkClick r:id="rId6" invalidUrl="https://github.com/are883/HMIS2017/blob/master/Presentación HMIS/MSBuild en Visual Studio.pdf"/>
+              <a:rPr lang="es-ES_tradnl" sz="2600" dirty="0" smtClean="0">
+                <a:hlinkClick r:id="rId7" invalidUrl="https://github.com/are883/HMIS2017/blob/master/Presentación HMIS/MSBuild en Visual Studio.pdf"/>
               </a:rPr>
               <a:t>/are883/HMIS2017/blob/master/Presentación%20HMIS/MSBuild%20en%20Visual%20Studio.pdf</a:t>
             </a:r>
-            <a:endParaRPr lang="es-ES_tradnl" dirty="0" smtClean="0"/>
-          </a:p>
-          <a:p>
-            <a:pPr marL="0" indent="0">
-              <a:buNone/>
-            </a:pPr>
-            <a:endParaRPr lang="es-ES_tradnl" dirty="0"/>
-          </a:p>
-          <a:p>
-            <a:pPr marL="0" indent="0">
-              <a:buNone/>
-            </a:pPr>
             <a:endParaRPr lang="es-ES_tradnl" dirty="0"/>
           </a:p>
         </p:txBody>
@@ -9565,13 +9594,13 @@
   <p:clrMapOvr>
     <a:masterClrMapping/>
   </p:clrMapOvr>
-  <mc:AlternateContent xmlns:mc="http://schemas.openxmlformats.org/markup-compatibility/2006">
-    <mc:Choice xmlns:p159="http://schemas.microsoft.com/office/powerpoint/2015/09/main" Requires="p159">
+  <mc:AlternateContent xmlns:mc="http://schemas.openxmlformats.org/markup-compatibility/2006" xmlns:p159="http://schemas.microsoft.com/office/powerpoint/2015/09/main">
+    <mc:Choice Requires="p159">
       <p:transition xmlns:p14="http://schemas.microsoft.com/office/powerpoint/2010/main" spd="slow" p14:dur="2000">
-        <p159:morph option="byObject"/>
+        <p159:morph option="byWord"/>
       </p:transition>
     </mc:Choice>
-    <mc:Fallback>
+    <mc:Fallback xmlns="">
       <p:transition spd="slow">
         <p:fade/>
       </p:transition>
@@ -9628,97 +9657,18 @@
           <a:p>
             <a:pPr algn="ctr"/>
             <a:r>
-              <a:rPr lang="es-ES_tradnl" sz="6000" b="0" kern="1200" dirty="0" smtClean="0">
-                <a:gradFill flip="none" rotWithShape="1">
-                  <a:gsLst>
-                    <a:gs pos="28000">
-                      <a:schemeClr val="tx1">
-                        <a:lumMod val="93000"/>
-                      </a:schemeClr>
-                    </a:gs>
-                    <a:gs pos="0">
-                      <a:schemeClr val="bg1">
-                        <a:lumMod val="25000"/>
-                        <a:lumOff val="75000"/>
-                      </a:schemeClr>
-                    </a:gs>
-                    <a:gs pos="100000">
-                      <a:schemeClr val="tx2">
-                        <a:lumMod val="0"/>
-                        <a:lumOff val="100000"/>
-                      </a:schemeClr>
-                    </a:gs>
-                  </a:gsLst>
-                  <a:lin ang="4800000" scaled="0"/>
-                  <a:tileRect/>
-                </a:gradFill>
-                <a:effectLst/>
-              </a:rPr>
-              <a:t>¿Qué tiene de especial </a:t>
-            </a:r>
-            <a:r>
-              <a:rPr lang="es-ES_tradnl" sz="6000" b="0" kern="1200" dirty="0" err="1" smtClean="0">
-                <a:gradFill flip="none" rotWithShape="1">
-                  <a:gsLst>
-                    <a:gs pos="28000">
-                      <a:schemeClr val="tx1">
-                        <a:lumMod val="93000"/>
-                      </a:schemeClr>
-                    </a:gs>
-                    <a:gs pos="0">
-                      <a:schemeClr val="bg1">
-                        <a:lumMod val="25000"/>
-                        <a:lumOff val="75000"/>
-                      </a:schemeClr>
-                    </a:gs>
-                    <a:gs pos="100000">
-                      <a:schemeClr val="tx2">
-                        <a:lumMod val="0"/>
-                        <a:lumOff val="100000"/>
-                      </a:schemeClr>
-                    </a:gs>
-                  </a:gsLst>
-                  <a:lin ang="4800000" scaled="0"/>
-                  <a:tileRect/>
-                </a:gradFill>
-                <a:effectLst/>
-              </a:rPr>
+              <a:rPr lang="es-ES_tradnl" sz="6000" dirty="0"/>
+              <a:t>¿Qué hace especial a </a:t>
+            </a:r>
+            <a:r>
+              <a:rPr lang="es-ES_tradnl" sz="6000" dirty="0" err="1"/>
               <a:t>MSBuild</a:t>
             </a:r>
             <a:r>
-              <a:rPr lang="es-ES_tradnl" sz="6000" b="0" kern="1200" dirty="0" smtClean="0">
-                <a:gradFill flip="none" rotWithShape="1">
-                  <a:gsLst>
-                    <a:gs pos="28000">
-                      <a:schemeClr val="tx1">
-                        <a:lumMod val="93000"/>
-                      </a:schemeClr>
-                    </a:gs>
-                    <a:gs pos="0">
-                      <a:schemeClr val="bg1">
-                        <a:lumMod val="25000"/>
-                        <a:lumOff val="75000"/>
-                      </a:schemeClr>
-                    </a:gs>
-                    <a:gs pos="100000">
-                      <a:schemeClr val="tx2">
-                        <a:lumMod val="0"/>
-                        <a:lumOff val="100000"/>
-                      </a:schemeClr>
-                    </a:gs>
-                  </a:gsLst>
-                  <a:lin ang="4800000" scaled="0"/>
-                  <a:tileRect/>
-                </a:gradFill>
-                <a:effectLst/>
-              </a:rPr>
-              <a:t>?</a:t>
-            </a:r>
-            <a:r>
-              <a:rPr lang="es-ES_tradnl" sz="6000" dirty="0" smtClean="0"/>
-              <a:t> </a:t>
-            </a:r>
-            <a:endParaRPr lang="es-ES_tradnl" sz="6000" dirty="0"/>
+              <a:rPr lang="es-ES_tradnl" sz="6000" dirty="0"/>
+              <a:t>? </a:t>
+            </a:r>
+            <a:endParaRPr lang="es-ES_tradnl" sz="6600" dirty="0"/>
           </a:p>
         </p:txBody>
       </p:sp>
@@ -9732,13 +9682,13 @@
   <p:clrMapOvr>
     <a:masterClrMapping/>
   </p:clrMapOvr>
-  <mc:AlternateContent xmlns:mc="http://schemas.openxmlformats.org/markup-compatibility/2006">
-    <mc:Choice xmlns:p159="http://schemas.microsoft.com/office/powerpoint/2015/09/main" Requires="p159">
-      <p:transition xmlns:p14="http://schemas.microsoft.com/office/powerpoint/2010/main" spd="slow" p14:dur="2000">
-        <p159:morph option="byObject"/>
+  <mc:AlternateContent xmlns:mc="http://schemas.openxmlformats.org/markup-compatibility/2006" xmlns:p14="http://schemas.microsoft.com/office/powerpoint/2010/main">
+    <mc:Choice Requires="p14">
+      <p:transition spd="slow" p14:dur="3400">
+        <p14:reveal/>
       </p:transition>
     </mc:Choice>
-    <mc:Fallback>
+    <mc:Fallback xmlns="">
       <p:transition spd="slow">
         <p:fade/>
       </p:transition>
@@ -9810,7 +9760,23 @@
             </a:r>
             <a:r>
               <a:rPr lang="es-ES_tradnl" sz="4400" dirty="0"/>
-              <a:t>nuevo formato de archivo de proyecto basado en código XML que es sencillo de comprender, fácil de ampliar y totalmente compatible con Microsoft. </a:t>
+              <a:t>nuevo formato </a:t>
+            </a:r>
+            <a:r>
+              <a:rPr lang="es-ES_tradnl" sz="4400" dirty="0" smtClean="0"/>
+              <a:t>de </a:t>
+            </a:r>
+            <a:r>
+              <a:rPr lang="es-ES_tradnl" sz="4400" dirty="0"/>
+              <a:t>archivo de proyecto basado en código XML que es sencillo de comprender, </a:t>
+            </a:r>
+            <a:r>
+              <a:rPr lang="es-ES_tradnl" sz="4400" dirty="0" smtClean="0"/>
+              <a:t>fácil de ampliar </a:t>
+            </a:r>
+            <a:r>
+              <a:rPr lang="es-ES_tradnl" sz="4400" dirty="0"/>
+              <a:t>y totalmente compatible con Microsoft. </a:t>
             </a:r>
           </a:p>
         </p:txBody>
@@ -9837,7 +9803,7 @@
           <a:lstStyle/>
           <a:p>
             <a:r>
-              <a:rPr lang="es-ES_tradnl" sz="5400" dirty="0">
+              <a:rPr lang="es-ES_tradnl" sz="5400" dirty="0" smtClean="0">
                 <a:gradFill flip="none" rotWithShape="1">
                   <a:gsLst>
                     <a:gs pos="28000">
@@ -9862,10 +9828,10 @@
                   <a:tileRect/>
                 </a:gradFill>
               </a:rPr>
-              <a:t>¿Qué tiene de especial </a:t>
-            </a:r>
-            <a:r>
-              <a:rPr lang="es-ES_tradnl" sz="5400" dirty="0" err="1">
+              <a:t>¿Qué hace especial a </a:t>
+            </a:r>
+            <a:r>
+              <a:rPr lang="es-ES_tradnl" sz="5400" dirty="0" err="1" smtClean="0">
                 <a:gradFill flip="none" rotWithShape="1">
                   <a:gsLst>
                     <a:gs pos="28000">
@@ -9938,13 +9904,13 @@
   <p:clrMapOvr>
     <a:masterClrMapping/>
   </p:clrMapOvr>
-  <mc:AlternateContent xmlns:mc="http://schemas.openxmlformats.org/markup-compatibility/2006">
-    <mc:Choice xmlns:p159="http://schemas.microsoft.com/office/powerpoint/2015/09/main" Requires="p159">
+  <mc:AlternateContent xmlns:mc="http://schemas.openxmlformats.org/markup-compatibility/2006" xmlns:p159="http://schemas.microsoft.com/office/powerpoint/2015/09/main">
+    <mc:Choice Requires="p159">
       <p:transition xmlns:p14="http://schemas.microsoft.com/office/powerpoint/2010/main" spd="slow" p14:dur="2000">
-        <p159:morph option="byObject"/>
+        <p159:morph option="byWord"/>
       </p:transition>
     </mc:Choice>
-    <mc:Fallback>
+    <mc:Fallback xmlns="">
       <p:transition spd="slow">
         <p:fade/>
       </p:transition>
@@ -10073,13 +10039,13 @@
   <p:clrMapOvr>
     <a:masterClrMapping/>
   </p:clrMapOvr>
-  <mc:AlternateContent xmlns:mc="http://schemas.openxmlformats.org/markup-compatibility/2006">
-    <mc:Choice xmlns:p159="http://schemas.microsoft.com/office/powerpoint/2015/09/main" Requires="p159">
+  <mc:AlternateContent xmlns:mc="http://schemas.openxmlformats.org/markup-compatibility/2006" xmlns:p159="http://schemas.microsoft.com/office/powerpoint/2015/09/main">
+    <mc:Choice Requires="p159">
       <p:transition xmlns:p14="http://schemas.microsoft.com/office/powerpoint/2010/main" spd="slow" p14:dur="2000">
         <p159:morph option="byObject"/>
       </p:transition>
     </mc:Choice>
-    <mc:Fallback>
+    <mc:Fallback xmlns="">
       <p:transition spd="slow">
         <p:fade/>
       </p:transition>
@@ -10153,13 +10119,13 @@
   <p:clrMapOvr>
     <a:masterClrMapping/>
   </p:clrMapOvr>
-  <mc:AlternateContent xmlns:mc="http://schemas.openxmlformats.org/markup-compatibility/2006">
-    <mc:Choice xmlns:p159="http://schemas.microsoft.com/office/powerpoint/2015/09/main" Requires="p159">
-      <p:transition xmlns:p14="http://schemas.microsoft.com/office/powerpoint/2010/main" spd="slow" p14:dur="2000">
-        <p159:morph option="byObject"/>
+  <mc:AlternateContent xmlns:mc="http://schemas.openxmlformats.org/markup-compatibility/2006" xmlns:p14="http://schemas.microsoft.com/office/powerpoint/2010/main">
+    <mc:Choice Requires="p14">
+      <p:transition spd="slow" p14:dur="3400">
+        <p14:reveal/>
       </p:transition>
     </mc:Choice>
-    <mc:Fallback>
+    <mc:Fallback xmlns="">
       <p:transition spd="slow">
         <p:fade/>
       </p:transition>
@@ -10256,13 +10222,13 @@
   <p:clrMapOvr>
     <a:masterClrMapping/>
   </p:clrMapOvr>
-  <mc:AlternateContent xmlns:mc="http://schemas.openxmlformats.org/markup-compatibility/2006">
-    <mc:Choice xmlns:p159="http://schemas.microsoft.com/office/powerpoint/2015/09/main" Requires="p159">
+  <mc:AlternateContent xmlns:mc="http://schemas.openxmlformats.org/markup-compatibility/2006" xmlns:p159="http://schemas.microsoft.com/office/powerpoint/2015/09/main">
+    <mc:Choice Requires="p159">
       <p:transition xmlns:p14="http://schemas.microsoft.com/office/powerpoint/2010/main" spd="slow" p14:dur="2000">
-        <p159:morph option="byObject"/>
+        <p159:morph option="byWord"/>
       </p:transition>
     </mc:Choice>
-    <mc:Fallback>
+    <mc:Fallback xmlns="">
       <p:transition spd="slow">
         <p:fade/>
       </p:transition>
@@ -10364,13 +10330,13 @@
   <p:clrMapOvr>
     <a:masterClrMapping/>
   </p:clrMapOvr>
-  <mc:AlternateContent xmlns:mc="http://schemas.openxmlformats.org/markup-compatibility/2006">
-    <mc:Choice xmlns:p159="http://schemas.microsoft.com/office/powerpoint/2015/09/main" Requires="p159">
+  <mc:AlternateContent xmlns:mc="http://schemas.openxmlformats.org/markup-compatibility/2006" xmlns:p159="http://schemas.microsoft.com/office/powerpoint/2015/09/main">
+    <mc:Choice Requires="p159">
       <p:transition xmlns:p14="http://schemas.microsoft.com/office/powerpoint/2010/main" spd="slow" p14:dur="2000">
         <p159:morph option="byObject"/>
       </p:transition>
     </mc:Choice>
-    <mc:Fallback>
+    <mc:Fallback xmlns="">
       <p:transition spd="slow">
         <p:fade/>
       </p:transition>

</xml_diff>